<commit_message>
Export presentation to pdf
</commit_message>
<xml_diff>
--- a/rain_predict_aus.pptx
+++ b/rain_predict_aus.pptx
@@ -13,7 +13,8 @@
     <p:sldId id="266" r:id="rId7"/>
     <p:sldId id="267" r:id="rId8"/>
     <p:sldId id="265" r:id="rId9"/>
-    <p:sldId id="268" r:id="rId10"/>
+    <p:sldId id="269" r:id="rId10"/>
+    <p:sldId id="268" r:id="rId11"/>
   </p:sldIdLst>
   <p:sldSz cx="12192000" cy="6858000"/>
   <p:notesSz cx="6858000" cy="9144000"/>
@@ -843,7 +844,7 @@
             <a:fld id="{B61BEF0D-F0BB-DE4B-95CE-6DB70DBA9567}" type="datetimeFigureOut">
               <a:rPr lang="en-US" smtClean="0"/>
               <a:pPr/>
-              <a:t>4/18/2019</a:t>
+              <a:t>4/22/2019</a:t>
             </a:fld>
             <a:endParaRPr lang="en-US" dirty="0"/>
           </a:p>
@@ -1096,7 +1097,7 @@
             <a:fld id="{B61BEF0D-F0BB-DE4B-95CE-6DB70DBA9567}" type="datetimeFigureOut">
               <a:rPr lang="en-US" smtClean="0"/>
               <a:pPr/>
-              <a:t>4/18/2019</a:t>
+              <a:t>4/22/2019</a:t>
             </a:fld>
             <a:endParaRPr lang="en-US" dirty="0"/>
           </a:p>
@@ -1412,7 +1413,7 @@
             <a:fld id="{B61BEF0D-F0BB-DE4B-95CE-6DB70DBA9567}" type="datetimeFigureOut">
               <a:rPr lang="en-US" smtClean="0"/>
               <a:pPr/>
-              <a:t>4/18/2019</a:t>
+              <a:t>4/22/2019</a:t>
             </a:fld>
             <a:endParaRPr lang="en-US" dirty="0"/>
           </a:p>
@@ -1755,7 +1756,7 @@
             <a:fld id="{B61BEF0D-F0BB-DE4B-95CE-6DB70DBA9567}" type="datetimeFigureOut">
               <a:rPr lang="en-US" smtClean="0"/>
               <a:pPr/>
-              <a:t>4/18/2019</a:t>
+              <a:t>4/22/2019</a:t>
             </a:fld>
             <a:endParaRPr lang="en-US" dirty="0"/>
           </a:p>
@@ -2071,7 +2072,7 @@
             <a:fld id="{B61BEF0D-F0BB-DE4B-95CE-6DB70DBA9567}" type="datetimeFigureOut">
               <a:rPr lang="en-US" smtClean="0"/>
               <a:pPr/>
-              <a:t>4/18/2019</a:t>
+              <a:t>4/22/2019</a:t>
             </a:fld>
             <a:endParaRPr lang="en-US" dirty="0"/>
           </a:p>
@@ -2466,7 +2467,7 @@
             <a:fld id="{B61BEF0D-F0BB-DE4B-95CE-6DB70DBA9567}" type="datetimeFigureOut">
               <a:rPr lang="en-US" smtClean="0"/>
               <a:pPr/>
-              <a:t>4/18/2019</a:t>
+              <a:t>4/22/2019</a:t>
             </a:fld>
             <a:endParaRPr lang="en-US" dirty="0"/>
           </a:p>
@@ -2638,7 +2639,7 @@
             <a:fld id="{B61BEF0D-F0BB-DE4B-95CE-6DB70DBA9567}" type="datetimeFigureOut">
               <a:rPr lang="en-US" smtClean="0"/>
               <a:pPr/>
-              <a:t>4/18/2019</a:t>
+              <a:t>4/22/2019</a:t>
             </a:fld>
             <a:endParaRPr lang="en-US" dirty="0"/>
           </a:p>
@@ -2820,7 +2821,7 @@
             <a:fld id="{B61BEF0D-F0BB-DE4B-95CE-6DB70DBA9567}" type="datetimeFigureOut">
               <a:rPr lang="en-US" smtClean="0"/>
               <a:pPr/>
-              <a:t>4/18/2019</a:t>
+              <a:t>4/22/2019</a:t>
             </a:fld>
             <a:endParaRPr lang="en-US" dirty="0"/>
           </a:p>
@@ -2998,7 +2999,7 @@
             <a:fld id="{B61BEF0D-F0BB-DE4B-95CE-6DB70DBA9567}" type="datetimeFigureOut">
               <a:rPr lang="en-US" smtClean="0"/>
               <a:pPr/>
-              <a:t>4/18/2019</a:t>
+              <a:t>4/22/2019</a:t>
             </a:fld>
             <a:endParaRPr lang="en-US" dirty="0"/>
           </a:p>
@@ -3247,7 +3248,7 @@
             <a:fld id="{B61BEF0D-F0BB-DE4B-95CE-6DB70DBA9567}" type="datetimeFigureOut">
               <a:rPr lang="en-US" smtClean="0"/>
               <a:pPr/>
-              <a:t>4/18/2019</a:t>
+              <a:t>4/22/2019</a:t>
             </a:fld>
             <a:endParaRPr lang="en-US" dirty="0"/>
           </a:p>
@@ -3481,7 +3482,7 @@
             <a:fld id="{B61BEF0D-F0BB-DE4B-95CE-6DB70DBA9567}" type="datetimeFigureOut">
               <a:rPr lang="en-US" smtClean="0"/>
               <a:pPr/>
-              <a:t>4/18/2019</a:t>
+              <a:t>4/22/2019</a:t>
             </a:fld>
             <a:endParaRPr lang="en-US" dirty="0"/>
           </a:p>
@@ -3857,7 +3858,7 @@
             <a:fld id="{B61BEF0D-F0BB-DE4B-95CE-6DB70DBA9567}" type="datetimeFigureOut">
               <a:rPr lang="en-US" smtClean="0"/>
               <a:pPr/>
-              <a:t>4/18/2019</a:t>
+              <a:t>4/22/2019</a:t>
             </a:fld>
             <a:endParaRPr lang="en-US" dirty="0"/>
           </a:p>
@@ -3982,7 +3983,7 @@
             <a:fld id="{B61BEF0D-F0BB-DE4B-95CE-6DB70DBA9567}" type="datetimeFigureOut">
               <a:rPr lang="en-US" smtClean="0"/>
               <a:pPr/>
-              <a:t>4/18/2019</a:t>
+              <a:t>4/22/2019</a:t>
             </a:fld>
             <a:endParaRPr lang="en-US" dirty="0"/>
           </a:p>
@@ -4079,7 +4080,7 @@
             <a:fld id="{B61BEF0D-F0BB-DE4B-95CE-6DB70DBA9567}" type="datetimeFigureOut">
               <a:rPr lang="en-US" smtClean="0"/>
               <a:pPr/>
-              <a:t>4/18/2019</a:t>
+              <a:t>4/22/2019</a:t>
             </a:fld>
             <a:endParaRPr lang="en-US" dirty="0"/>
           </a:p>
@@ -4336,7 +4337,7 @@
             <a:fld id="{B61BEF0D-F0BB-DE4B-95CE-6DB70DBA9567}" type="datetimeFigureOut">
               <a:rPr lang="en-US" smtClean="0"/>
               <a:pPr/>
-              <a:t>4/18/2019</a:t>
+              <a:t>4/22/2019</a:t>
             </a:fld>
             <a:endParaRPr lang="en-US" dirty="0"/>
           </a:p>
@@ -4601,7 +4602,7 @@
             <a:fld id="{B61BEF0D-F0BB-DE4B-95CE-6DB70DBA9567}" type="datetimeFigureOut">
               <a:rPr lang="en-US" smtClean="0"/>
               <a:pPr/>
-              <a:t>4/18/2019</a:t>
+              <a:t>4/22/2019</a:t>
             </a:fld>
             <a:endParaRPr lang="en-US" dirty="0"/>
           </a:p>
@@ -5346,7 +5347,7 @@
             <a:fld id="{B61BEF0D-F0BB-DE4B-95CE-6DB70DBA9567}" type="datetimeFigureOut">
               <a:rPr lang="en-US" smtClean="0"/>
               <a:pPr/>
-              <a:t>4/18/2019</a:t>
+              <a:t>4/22/2019</a:t>
             </a:fld>
             <a:endParaRPr lang="en-US" dirty="0"/>
           </a:p>
@@ -5975,6 +5976,238 @@
 </p:sld>
 </file>
 
+<file path=ppt/slides/slide10.xml><?xml version="1.0" encoding="utf-8"?>
+<p:sld xmlns:a="http://schemas.openxmlformats.org/drawingml/2006/main" xmlns:r="http://schemas.openxmlformats.org/officeDocument/2006/relationships" xmlns:p="http://schemas.openxmlformats.org/presentationml/2006/main">
+  <p:cSld>
+    <p:bg>
+      <p:bgPr>
+        <a:solidFill>
+          <a:schemeClr val="bg1"/>
+        </a:solidFill>
+        <a:effectLst/>
+      </p:bgPr>
+    </p:bg>
+    <p:spTree>
+      <p:nvGrpSpPr>
+        <p:cNvPr id="1" name=""/>
+        <p:cNvGrpSpPr/>
+        <p:nvPr/>
+      </p:nvGrpSpPr>
+      <p:grpSpPr>
+        <a:xfrm>
+          <a:off x="0" y="0"/>
+          <a:ext cx="0" cy="0"/>
+          <a:chOff x="0" y="0"/>
+          <a:chExt cx="0" cy="0"/>
+        </a:xfrm>
+      </p:grpSpPr>
+      <p:cxnSp>
+        <p:nvCxnSpPr>
+          <p:cNvPr id="28" name="Straight Connector 7">
+            <a:extLst>
+              <a:ext uri="{FF2B5EF4-FFF2-40B4-BE49-F238E27FC236}">
+                <a16:creationId xmlns:a16="http://schemas.microsoft.com/office/drawing/2014/main" id="{0B5F7E3B-C5F1-40E0-A491-558BAFBC1127}"/>
+              </a:ext>
+              <a:ext uri="{C183D7F6-B498-43B3-948B-1728B52AA6E4}">
+                <adec:decorative xmlns:adec="http://schemas.microsoft.com/office/drawing/2017/decorative" val="1"/>
+              </a:ext>
+            </a:extLst>
+          </p:cNvPr>
+          <p:cNvCxnSpPr>
+            <a:cxnSpLocks noGrp="1" noRot="1" noChangeAspect="1" noMove="1" noResize="1" noEditPoints="1" noAdjustHandles="1" noChangeArrowheads="1" noChangeShapeType="1"/>
+          </p:cNvCxnSpPr>
+          <p:nvPr>
+            <p:extLst>
+              <p:ext uri="{386F3935-93C4-4BCD-93E2-E3B085C9AB24}">
+                <p16:designElem xmlns:p16="http://schemas.microsoft.com/office/powerpoint/2015/main" val="1"/>
+              </p:ext>
+            </p:extLst>
+          </p:nvPr>
+        </p:nvCxnSpPr>
+        <p:spPr>
+          <a:xfrm>
+            <a:off x="4241804" y="1460500"/>
+            <a:ext cx="0" cy="3937000"/>
+          </a:xfrm>
+          <a:prstGeom prst="line">
+            <a:avLst/>
+          </a:prstGeom>
+        </p:spPr>
+        <p:style>
+          <a:lnRef idx="1">
+            <a:schemeClr val="accent1"/>
+          </a:lnRef>
+          <a:fillRef idx="0">
+            <a:schemeClr val="accent1"/>
+          </a:fillRef>
+          <a:effectRef idx="0">
+            <a:schemeClr val="accent1"/>
+          </a:effectRef>
+          <a:fontRef idx="minor">
+            <a:schemeClr val="tx1"/>
+          </a:fontRef>
+        </p:style>
+      </p:cxnSp>
+      <p:sp>
+        <p:nvSpPr>
+          <p:cNvPr id="2" name="Title 1">
+            <a:extLst>
+              <a:ext uri="{FF2B5EF4-FFF2-40B4-BE49-F238E27FC236}">
+                <a16:creationId xmlns:a16="http://schemas.microsoft.com/office/drawing/2014/main" id="{0BA6C163-F609-47D6-9F13-9D5480273171}"/>
+              </a:ext>
+            </a:extLst>
+          </p:cNvPr>
+          <p:cNvSpPr>
+            <a:spLocks noGrp="1"/>
+          </p:cNvSpPr>
+          <p:nvPr>
+            <p:ph type="title"/>
+          </p:nvPr>
+        </p:nvSpPr>
+        <p:spPr>
+          <a:xfrm>
+            <a:off x="643467" y="816638"/>
+            <a:ext cx="3367359" cy="5224724"/>
+          </a:xfrm>
+        </p:spPr>
+        <p:txBody>
+          <a:bodyPr anchor="ctr">
+            <a:normAutofit/>
+          </a:bodyPr>
+          <a:lstStyle/>
+          <a:p>
+            <a:r>
+              <a:rPr lang="en-US" sz="2800"/>
+              <a:t>Recommendations</a:t>
+            </a:r>
+          </a:p>
+        </p:txBody>
+      </p:sp>
+      <p:sp>
+        <p:nvSpPr>
+          <p:cNvPr id="3" name="Content Placeholder 2">
+            <a:extLst>
+              <a:ext uri="{FF2B5EF4-FFF2-40B4-BE49-F238E27FC236}">
+                <a16:creationId xmlns:a16="http://schemas.microsoft.com/office/drawing/2014/main" id="{439C6392-B92D-4057-8007-079CC240A689}"/>
+              </a:ext>
+            </a:extLst>
+          </p:cNvPr>
+          <p:cNvSpPr>
+            <a:spLocks noGrp="1"/>
+          </p:cNvSpPr>
+          <p:nvPr>
+            <p:ph idx="1"/>
+          </p:nvPr>
+        </p:nvSpPr>
+        <p:spPr>
+          <a:xfrm>
+            <a:off x="4654295" y="816638"/>
+            <a:ext cx="4619706" cy="5224724"/>
+          </a:xfrm>
+        </p:spPr>
+        <p:txBody>
+          <a:bodyPr anchor="ctr">
+            <a:normAutofit/>
+          </a:bodyPr>
+          <a:lstStyle/>
+          <a:p>
+            <a:r>
+              <a:rPr lang="en-US" dirty="0"/>
+              <a:t>Model Choice:</a:t>
+            </a:r>
+          </a:p>
+          <a:p>
+            <a:pPr lvl="1"/>
+            <a:r>
+              <a:rPr lang="en-US" dirty="0"/>
+              <a:t>Depends on Goals!</a:t>
+            </a:r>
+          </a:p>
+          <a:p>
+            <a:pPr lvl="1"/>
+            <a:endParaRPr lang="en-US" dirty="0"/>
+          </a:p>
+          <a:p>
+            <a:r>
+              <a:rPr lang="en-US" dirty="0"/>
+              <a:t>For Meteorology:</a:t>
+            </a:r>
+          </a:p>
+          <a:p>
+            <a:pPr lvl="1"/>
+            <a:r>
+              <a:rPr lang="en-US" dirty="0"/>
+              <a:t>Choose </a:t>
+            </a:r>
+            <a:r>
+              <a:rPr lang="en-US" b="1" dirty="0"/>
+              <a:t>Realistic</a:t>
+            </a:r>
+            <a:r>
+              <a:rPr lang="en-US" dirty="0"/>
+              <a:t> Model</a:t>
+            </a:r>
+          </a:p>
+          <a:p>
+            <a:pPr lvl="1"/>
+            <a:r>
+              <a:rPr lang="en-US" dirty="0"/>
+              <a:t>Correct more on average</a:t>
+            </a:r>
+          </a:p>
+          <a:p>
+            <a:pPr lvl="1"/>
+            <a:endParaRPr lang="en-US" dirty="0"/>
+          </a:p>
+          <a:p>
+            <a:r>
+              <a:rPr lang="en-US" dirty="0"/>
+              <a:t>If we care more about Rain:</a:t>
+            </a:r>
+          </a:p>
+          <a:p>
+            <a:pPr lvl="1"/>
+            <a:r>
+              <a:rPr lang="en-US" dirty="0"/>
+              <a:t>Choose </a:t>
+            </a:r>
+            <a:r>
+              <a:rPr lang="en-US" b="1" dirty="0"/>
+              <a:t>Rain Focused</a:t>
+            </a:r>
+            <a:r>
+              <a:rPr lang="en-US" dirty="0"/>
+              <a:t> Model</a:t>
+            </a:r>
+          </a:p>
+          <a:p>
+            <a:pPr lvl="1"/>
+            <a:r>
+              <a:rPr lang="en-US" dirty="0"/>
+              <a:t>Correct more when it rains</a:t>
+            </a:r>
+          </a:p>
+          <a:p>
+            <a:pPr marL="457200" lvl="1" indent="0">
+              <a:buNone/>
+            </a:pPr>
+            <a:endParaRPr lang="en-US" dirty="0"/>
+          </a:p>
+        </p:txBody>
+      </p:sp>
+    </p:spTree>
+    <p:extLst>
+      <p:ext uri="{BB962C8B-B14F-4D97-AF65-F5344CB8AC3E}">
+        <p14:creationId xmlns:p14="http://schemas.microsoft.com/office/powerpoint/2010/main" val="3180527940"/>
+      </p:ext>
+    </p:extLst>
+  </p:cSld>
+  <p:clrMapOvr>
+    <a:masterClrMapping/>
+  </p:clrMapOvr>
+</p:sld>
+</file>
+
 <file path=ppt/slides/slide2.xml><?xml version="1.0" encoding="utf-8"?>
 <p:sld xmlns:a="http://schemas.openxmlformats.org/drawingml/2006/main" xmlns:r="http://schemas.openxmlformats.org/officeDocument/2006/relationships" xmlns:p="http://schemas.openxmlformats.org/presentationml/2006/main">
   <p:cSld>
@@ -7034,7 +7267,7 @@
           <a:lstStyle/>
           <a:p>
             <a:r>
-              <a:rPr lang="en-US" b="1" dirty="0">
+              <a:rPr lang="en-US" sz="3400" b="1" dirty="0">
                 <a:solidFill>
                   <a:schemeClr val="bg1"/>
                 </a:solidFill>
@@ -7042,7 +7275,7 @@
               <a:t>Problem: </a:t>
             </a:r>
             <a:r>
-              <a:rPr lang="en-US" dirty="0">
+              <a:rPr lang="en-US" sz="3400" dirty="0">
                 <a:solidFill>
                   <a:schemeClr val="bg1"/>
                 </a:solidFill>
@@ -7081,7 +7314,7 @@
           <a:lstStyle/>
           <a:p>
             <a:r>
-              <a:rPr lang="en-US" sz="2400" dirty="0">
+              <a:rPr lang="en-US" sz="2200" dirty="0">
                 <a:solidFill>
                   <a:schemeClr val="bg1"/>
                 </a:solidFill>
@@ -7090,8 +7323,18 @@
             </a:r>
           </a:p>
           <a:p>
-            <a:r>
-              <a:rPr lang="en-US" sz="2400" dirty="0">
+            <a:pPr marL="0" indent="0">
+              <a:buNone/>
+            </a:pPr>
+            <a:endParaRPr lang="en-US" sz="2200" dirty="0">
+              <a:solidFill>
+                <a:schemeClr val="bg1"/>
+              </a:solidFill>
+            </a:endParaRPr>
+          </a:p>
+          <a:p>
+            <a:r>
+              <a:rPr lang="en-US" sz="2200" dirty="0">
                 <a:solidFill>
                   <a:schemeClr val="bg1"/>
                 </a:solidFill>
@@ -7102,7 +7345,7 @@
           <a:p>
             <a:pPr lvl="1"/>
             <a:r>
-              <a:rPr lang="en-US" sz="2400" dirty="0">
+              <a:rPr lang="en-US" sz="2200" dirty="0">
                 <a:solidFill>
                   <a:schemeClr val="bg1"/>
                 </a:solidFill>
@@ -7501,7 +7744,7 @@
           <a:lstStyle/>
           <a:p>
             <a:r>
-              <a:rPr lang="en-US" b="1" dirty="0">
+              <a:rPr lang="en-US" sz="3400" b="1" dirty="0">
                 <a:solidFill>
                   <a:schemeClr val="bg1"/>
                 </a:solidFill>
@@ -7509,14 +7752,14 @@
               <a:t>Solution: </a:t>
             </a:r>
             <a:r>
-              <a:rPr lang="en-US" dirty="0" err="1">
+              <a:rPr lang="en-US" sz="3400" dirty="0" err="1">
                 <a:solidFill>
                   <a:schemeClr val="bg1"/>
                 </a:solidFill>
               </a:rPr>
               <a:t>Upsampling</a:t>
             </a:r>
-            <a:endParaRPr lang="en-US" dirty="0">
+            <a:endParaRPr lang="en-US" sz="3400" dirty="0">
               <a:solidFill>
                 <a:schemeClr val="bg1"/>
               </a:solidFill>
@@ -7553,7 +7796,7 @@
           <a:lstStyle/>
           <a:p>
             <a:r>
-              <a:rPr lang="en-US" sz="2400" dirty="0">
+              <a:rPr lang="en-US" sz="2200" dirty="0">
                 <a:solidFill>
                   <a:schemeClr val="bg1"/>
                 </a:solidFill>
@@ -7562,8 +7805,18 @@
             </a:r>
           </a:p>
           <a:p>
-            <a:r>
-              <a:rPr lang="en-US" sz="2400" dirty="0">
+            <a:pPr marL="0" indent="0">
+              <a:buNone/>
+            </a:pPr>
+            <a:endParaRPr lang="en-US" sz="2200" dirty="0">
+              <a:solidFill>
+                <a:schemeClr val="bg1"/>
+              </a:solidFill>
+            </a:endParaRPr>
+          </a:p>
+          <a:p>
+            <a:r>
+              <a:rPr lang="en-US" sz="2200" dirty="0">
                 <a:solidFill>
                   <a:schemeClr val="bg1"/>
                 </a:solidFill>
@@ -8859,7 +9112,7 @@
           <a:p>
             <a:r>
               <a:rPr lang="en-US" dirty="0"/>
-              <a:t>Two Model Options:</a:t>
+              <a:t>Model Options:</a:t>
             </a:r>
           </a:p>
           <a:p>
@@ -8909,48 +9162,9 @@
             </a:r>
           </a:p>
           <a:p>
-            <a:pPr lvl="2"/>
-            <a:endParaRPr lang="en-US" dirty="0"/>
-          </a:p>
-          <a:p>
-            <a:pPr lvl="1"/>
-            <a:r>
-              <a:rPr lang="en-US" b="1" dirty="0"/>
-              <a:t>Model 2 – </a:t>
-            </a:r>
-            <a:r>
-              <a:rPr lang="en-US" b="1" dirty="0" err="1"/>
-              <a:t>Upsampled</a:t>
-            </a:r>
-            <a:r>
-              <a:rPr lang="en-US" dirty="0"/>
-              <a:t>:</a:t>
-            </a:r>
-          </a:p>
-          <a:p>
-            <a:pPr lvl="2"/>
-            <a:r>
-              <a:rPr lang="en-US" dirty="0"/>
-              <a:t>Not very accurate</a:t>
-            </a:r>
-          </a:p>
-          <a:p>
-            <a:pPr lvl="2"/>
-            <a:r>
-              <a:rPr lang="en-US" dirty="0"/>
-              <a:t>But, when it rains, right 90% of the time</a:t>
-            </a:r>
-          </a:p>
-          <a:p>
-            <a:pPr lvl="2"/>
-            <a:r>
-              <a:rPr lang="en-US" dirty="0"/>
-              <a:t>Overall: </a:t>
-            </a:r>
-            <a:r>
-              <a:rPr lang="en-US" b="1" dirty="0"/>
-              <a:t>Rain Focused</a:t>
-            </a:r>
+            <a:pPr marL="914400" lvl="2" indent="0">
+              <a:buNone/>
+            </a:pPr>
             <a:endParaRPr lang="en-US" dirty="0"/>
           </a:p>
         </p:txBody>
@@ -9105,82 +9319,58 @@
           <a:p>
             <a:r>
               <a:rPr lang="en-US" dirty="0"/>
-              <a:t>Model Choice:</a:t>
-            </a:r>
+              <a:t>Model Options:</a:t>
+            </a:r>
+          </a:p>
+          <a:p>
+            <a:pPr marL="0" indent="0">
+              <a:buNone/>
+            </a:pPr>
+            <a:endParaRPr lang="en-US" dirty="0"/>
           </a:p>
           <a:p>
             <a:pPr lvl="1"/>
             <a:r>
+              <a:rPr lang="en-US" b="1" dirty="0"/>
+              <a:t>Model 2 – </a:t>
+            </a:r>
+            <a:r>
+              <a:rPr lang="en-US" b="1" dirty="0" err="1"/>
+              <a:t>Upsampled</a:t>
+            </a:r>
+            <a:r>
               <a:rPr lang="en-US" dirty="0"/>
-              <a:t>Depends on Goals!</a:t>
-            </a:r>
-          </a:p>
-          <a:p>
-            <a:pPr lvl="1"/>
-            <a:endParaRPr lang="en-US" dirty="0"/>
-          </a:p>
-          <a:p>
+              <a:t>:</a:t>
+            </a:r>
+          </a:p>
+          <a:p>
+            <a:pPr lvl="2"/>
             <a:r>
               <a:rPr lang="en-US" dirty="0"/>
-              <a:t>For Meteorology:</a:t>
-            </a:r>
-          </a:p>
-          <a:p>
-            <a:pPr lvl="1"/>
+              <a:t>Not very accurate</a:t>
+            </a:r>
+          </a:p>
+          <a:p>
+            <a:pPr lvl="2"/>
             <a:r>
               <a:rPr lang="en-US" dirty="0"/>
-              <a:t>Choose </a:t>
-            </a:r>
-            <a:r>
-              <a:rPr lang="en-US" b="1" dirty="0"/>
-              <a:t>Realistic</a:t>
-            </a:r>
+              <a:t>But, when it rains, right 90% of the time</a:t>
+            </a:r>
+          </a:p>
+          <a:p>
+            <a:pPr lvl="2"/>
             <a:r>
               <a:rPr lang="en-US" dirty="0"/>
-              <a:t> Model</a:t>
-            </a:r>
-          </a:p>
-          <a:p>
-            <a:pPr lvl="1"/>
-            <a:r>
-              <a:rPr lang="en-US" dirty="0"/>
-              <a:t>Correct more on average</a:t>
-            </a:r>
-          </a:p>
-          <a:p>
-            <a:pPr lvl="1"/>
-            <a:endParaRPr lang="en-US" dirty="0"/>
-          </a:p>
-          <a:p>
-            <a:r>
-              <a:rPr lang="en-US" dirty="0"/>
-              <a:t>If we care more about Rain:</a:t>
-            </a:r>
-          </a:p>
-          <a:p>
-            <a:pPr lvl="1"/>
-            <a:r>
-              <a:rPr lang="en-US" dirty="0"/>
-              <a:t>Choose </a:t>
+              <a:t>Overall: </a:t>
             </a:r>
             <a:r>
               <a:rPr lang="en-US" b="1" dirty="0"/>
               <a:t>Rain Focused</a:t>
             </a:r>
-            <a:r>
-              <a:rPr lang="en-US" dirty="0"/>
-              <a:t> Model</a:t>
-            </a:r>
-          </a:p>
-          <a:p>
-            <a:pPr lvl="1"/>
-            <a:r>
-              <a:rPr lang="en-US" dirty="0"/>
-              <a:t>Correct more when it rains</a:t>
-            </a:r>
-          </a:p>
-          <a:p>
-            <a:pPr marL="457200" lvl="1" indent="0">
+            <a:endParaRPr lang="en-US" dirty="0"/>
+          </a:p>
+          <a:p>
+            <a:pPr marL="914400" lvl="2" indent="0">
               <a:buNone/>
             </a:pPr>
             <a:endParaRPr lang="en-US" dirty="0"/>
@@ -9190,7 +9380,7 @@
     </p:spTree>
     <p:extLst>
       <p:ext uri="{BB962C8B-B14F-4D97-AF65-F5344CB8AC3E}">
-        <p14:creationId xmlns:p14="http://schemas.microsoft.com/office/powerpoint/2010/main" val="3180527940"/>
+        <p14:creationId xmlns:p14="http://schemas.microsoft.com/office/powerpoint/2010/main" val="2687509760"/>
       </p:ext>
     </p:extLst>
   </p:cSld>

</xml_diff>